<commit_message>
Updated documentation of future work to include feature importances of gradient boosting model to discover features that are significant to model performance
</commit_message>
<xml_diff>
--- a/6_Documentation/Bank_Churn_Rate_Presentation.pptx
+++ b/6_Documentation/Bank_Churn_Rate_Presentation.pptx
@@ -2069,7 +2069,7 @@
           <a:p>
             <a:fld id="{AA74E6DA-C916-4BCE-A101-0DC09126B470}" type="datetimeFigureOut">
               <a:rPr lang="en-US" smtClean="0"/>
-              <a:t>12/7/2023</a:t>
+              <a:t>12/14/2023</a:t>
             </a:fld>
             <a:endParaRPr lang="en-US"/>
           </a:p>
@@ -2562,7 +2562,7 @@
           <a:p>
             <a:fld id="{4E9B4F57-B96C-436C-8E07-9ED15F333B94}" type="datetime1">
               <a:rPr lang="en-US" smtClean="0"/>
-              <a:t>12/7/2023</a:t>
+              <a:t>12/14/2023</a:t>
             </a:fld>
             <a:endParaRPr lang="en-US"/>
           </a:p>
@@ -2775,7 +2775,7 @@
           <a:p>
             <a:fld id="{E6CAFC69-17B8-49ED-8515-EEF742D798A3}" type="datetime1">
               <a:rPr lang="en-US" smtClean="0"/>
-              <a:t>12/7/2023</a:t>
+              <a:t>12/14/2023</a:t>
             </a:fld>
             <a:endParaRPr lang="en-US"/>
           </a:p>
@@ -3031,7 +3031,7 @@
           <a:p>
             <a:fld id="{49BD7017-5031-4A82-AAE7-53B05001D0CF}" type="datetime1">
               <a:rPr lang="en-US" smtClean="0"/>
-              <a:t>12/7/2023</a:t>
+              <a:t>12/14/2023</a:t>
             </a:fld>
             <a:endParaRPr lang="en-US"/>
           </a:p>
@@ -3201,7 +3201,7 @@
           <a:p>
             <a:fld id="{A9A38264-5CCD-493A-9147-46264A34D417}" type="datetime1">
               <a:rPr lang="en-US" smtClean="0"/>
-              <a:t>12/7/2023</a:t>
+              <a:t>12/14/2023</a:t>
             </a:fld>
             <a:endParaRPr lang="en-US"/>
           </a:p>
@@ -3544,7 +3544,7 @@
           <a:p>
             <a:fld id="{3F88EA74-F8A1-44F3-A943-871AE16A7C78}" type="datetime1">
               <a:rPr lang="en-US" smtClean="0"/>
-              <a:t>12/7/2023</a:t>
+              <a:t>12/14/2023</a:t>
             </a:fld>
             <a:endParaRPr lang="en-US"/>
           </a:p>
@@ -3819,7 +3819,7 @@
           <a:p>
             <a:fld id="{5EDD1233-B103-4F41-B1CD-BA0EAAAA00DE}" type="datetime1">
               <a:rPr lang="en-US" smtClean="0"/>
-              <a:t>12/7/2023</a:t>
+              <a:t>12/14/2023</a:t>
             </a:fld>
             <a:endParaRPr lang="en-US"/>
           </a:p>
@@ -4198,7 +4198,7 @@
           <a:p>
             <a:fld id="{A10B2C42-6C94-4108-8FBA-C36D549E0CB5}" type="datetime1">
               <a:rPr lang="en-US" smtClean="0"/>
-              <a:t>12/7/2023</a:t>
+              <a:t>12/14/2023</a:t>
             </a:fld>
             <a:endParaRPr lang="en-US"/>
           </a:p>
@@ -4316,7 +4316,7 @@
           <a:p>
             <a:fld id="{3D1741E9-4398-4324-AD5E-DC41833D0D5A}" type="datetime1">
               <a:rPr lang="en-US" smtClean="0"/>
-              <a:t>12/7/2023</a:t>
+              <a:t>12/14/2023</a:t>
             </a:fld>
             <a:endParaRPr lang="en-US"/>
           </a:p>
@@ -4487,7 +4487,7 @@
           <a:p>
             <a:fld id="{3906D151-408D-43A7-A31F-E9DD593775C0}" type="datetime1">
               <a:rPr lang="en-US" smtClean="0"/>
-              <a:t>12/7/2023</a:t>
+              <a:t>12/14/2023</a:t>
             </a:fld>
             <a:endParaRPr lang="en-US"/>
           </a:p>
@@ -4846,7 +4846,7 @@
           <a:p>
             <a:fld id="{2944029E-EF4E-46DD-9822-5110C1513648}" type="datetime1">
               <a:rPr lang="en-US" smtClean="0"/>
-              <a:t>12/7/2023</a:t>
+              <a:t>12/14/2023</a:t>
             </a:fld>
             <a:endParaRPr lang="en-US"/>
           </a:p>
@@ -5228,7 +5228,7 @@
           <a:p>
             <a:fld id="{8B851C8C-296E-4771-B364-133D71B0C358}" type="datetime1">
               <a:rPr lang="en-US" smtClean="0"/>
-              <a:t>12/7/2023</a:t>
+              <a:t>12/14/2023</a:t>
             </a:fld>
             <a:endParaRPr lang="en-US"/>
           </a:p>
@@ -5515,7 +5515,7 @@
           <a:p>
             <a:fld id="{B57E3975-6AC8-465E-9EDA-6F683FCFB259}" type="datetime1">
               <a:rPr lang="en-US" smtClean="0"/>
-              <a:t>12/7/2023</a:t>
+              <a:t>12/14/2023</a:t>
             </a:fld>
             <a:endParaRPr lang="en-US"/>
           </a:p>
@@ -9973,7 +9973,7 @@
                 <a:latin typeface="Arial"/>
                 <a:ea typeface="ＭＳ Ｐゴシック" pitchFamily="-110" charset="-128"/>
               </a:rPr>
-              <a:t>‘Missing’ vs. ‘Dropped’ Modeling Insights</a:t>
+              <a:t>‘Missing’ vs. ‘Dropped’ &amp; Modeling Insights</a:t>
             </a:r>
             <a:endParaRPr lang="en-US" sz="3600" dirty="0"/>
           </a:p>
@@ -10059,7 +10059,7 @@
         <p:spPr>
           <a:xfrm>
             <a:off x="736558" y="1678204"/>
-            <a:ext cx="8163955" cy="4555093"/>
+            <a:ext cx="8163955" cy="4832092"/>
           </a:xfrm>
           <a:prstGeom prst="rect">
             <a:avLst/>
@@ -10272,7 +10272,25 @@
                 </a:solidFill>
                 <a:latin typeface="Arial" panose="020B0604020202020204"/>
               </a:rPr>
-              <a:t>Future work to reduce Gradient Boosting Classifier training time and discover methods to improve MLP Neural Network Classifier.</a:t>
+              <a:t>Future work to reduce Gradient Boosting Classifier training time and uncover feature </a:t>
+            </a:r>
+            <a:r>
+              <a:rPr lang="en-US" dirty="0" err="1">
+                <a:solidFill>
+                  <a:srgbClr val="000000"/>
+                </a:solidFill>
+                <a:latin typeface="Arial" panose="020B0604020202020204"/>
+              </a:rPr>
+              <a:t>importances</a:t>
+            </a:r>
+            <a:r>
+              <a:rPr lang="en-US" dirty="0">
+                <a:solidFill>
+                  <a:srgbClr val="000000"/>
+                </a:solidFill>
+                <a:latin typeface="Arial" panose="020B0604020202020204"/>
+              </a:rPr>
+              <a:t> and discover methods to improve MLP Neural Network Classifier.</a:t>
             </a:r>
           </a:p>
           <a:p>

</xml_diff>

<commit_message>
Updated documentation for acknowledgements
</commit_message>
<xml_diff>
--- a/6_Documentation/Bank_Churn_Rate_Presentation.pptx
+++ b/6_Documentation/Bank_Churn_Rate_Presentation.pptx
@@ -6209,8 +6209,8 @@
         </p:nvSpPr>
         <p:spPr>
           <a:xfrm>
-            <a:off x="2611763" y="4401235"/>
-            <a:ext cx="3980577" cy="461665"/>
+            <a:off x="2451465" y="4401235"/>
+            <a:ext cx="4301177" cy="646331"/>
           </a:xfrm>
           <a:prstGeom prst="rect">
             <a:avLst/>
@@ -6229,6 +6229,31 @@
                 <a:cs typeface="Arial" panose="020B0604020202020204" pitchFamily="34" charset="0"/>
               </a:rPr>
               <a:t>Slide template provided by Sacramento State University</a:t>
+            </a:r>
+          </a:p>
+          <a:p>
+            <a:pPr algn="ctr"/>
+            <a:r>
+              <a:rPr lang="en-US" baseline="30000" dirty="0">
+                <a:latin typeface="Arial" panose="020B0604020202020204" pitchFamily="34" charset="0"/>
+                <a:cs typeface="Arial" panose="020B0604020202020204" pitchFamily="34" charset="0"/>
+              </a:rPr>
+              <a:t>Acknowledgement to </a:t>
+            </a:r>
+            <a:r>
+              <a:rPr lang="en-US" baseline="30000" dirty="0">
+                <a:latin typeface="Arial" panose="020B0604020202020204" pitchFamily="34" charset="0"/>
+                <a:cs typeface="Arial" panose="020B0604020202020204" pitchFamily="34" charset="0"/>
+                <a:hlinkClick r:id="rId2"/>
+              </a:rPr>
+              <a:t>Eric Callahan</a:t>
+            </a:r>
+            <a:r>
+              <a:rPr lang="en-US" baseline="30000" dirty="0">
+                <a:latin typeface="Arial" panose="020B0604020202020204" pitchFamily="34" charset="0"/>
+                <a:cs typeface="Arial" panose="020B0604020202020204" pitchFamily="34" charset="0"/>
+              </a:rPr>
+              <a:t> for guidance and support</a:t>
             </a:r>
           </a:p>
           <a:p>
@@ -6255,7 +6280,7 @@
           <p:nvPr/>
         </p:nvPicPr>
         <p:blipFill>
-          <a:blip r:embed="rId2">
+          <a:blip r:embed="rId3">
             <a:extLst>
               <a:ext uri="{28A0092B-C50C-407E-A947-70E740481C1C}">
                 <a14:useLocalDpi xmlns:a14="http://schemas.microsoft.com/office/drawing/2010/main" val="0"/>

</xml_diff>